<commit_message>
update lecture day 1
</commit_message>
<xml_diff>
--- a/Lectures/Day1_Intro.pptx
+++ b/Lectures/Day1_Intro.pptx
@@ -5,7 +5,7 @@
     <p:sldMasterId id="2147483648" r:id="rId1"/>
   </p:sldMasterIdLst>
   <p:notesMasterIdLst>
-    <p:notesMasterId r:id="rId37"/>
+    <p:notesMasterId r:id="rId38"/>
   </p:notesMasterIdLst>
   <p:sldIdLst>
     <p:sldId id="257" r:id="rId2"/>
@@ -37,12 +37,13 @@
     <p:sldId id="292" r:id="rId28"/>
     <p:sldId id="294" r:id="rId29"/>
     <p:sldId id="295" r:id="rId30"/>
-    <p:sldId id="296" r:id="rId31"/>
-    <p:sldId id="297" r:id="rId32"/>
-    <p:sldId id="299" r:id="rId33"/>
-    <p:sldId id="284" r:id="rId34"/>
-    <p:sldId id="266" r:id="rId35"/>
-    <p:sldId id="270" r:id="rId36"/>
+    <p:sldId id="300" r:id="rId31"/>
+    <p:sldId id="296" r:id="rId32"/>
+    <p:sldId id="297" r:id="rId33"/>
+    <p:sldId id="299" r:id="rId34"/>
+    <p:sldId id="284" r:id="rId35"/>
+    <p:sldId id="266" r:id="rId36"/>
+    <p:sldId id="270" r:id="rId37"/>
   </p:sldIdLst>
   <p:sldSz cx="12192000" cy="6858000"/>
   <p:notesSz cx="6858000" cy="9144000"/>
@@ -142,14 +143,6 @@
     </a:lvl9pPr>
   </p:defaultTextStyle>
 </p:presentation>
-</file>
-
-<file path=ppt/revisionInfo.xml><?xml version="1.0" encoding="utf-8"?>
-<p1510:revInfo xmlns:a="http://schemas.openxmlformats.org/drawingml/2006/main" xmlns:r="http://schemas.openxmlformats.org/officeDocument/2006/relationships" xmlns:p1510="http://schemas.microsoft.com/office/powerpoint/2015/10/main">
-  <p1510:revLst>
-    <p1510:client id="{620E395D-7B49-1144-8738-BFE71E51C187}" v="1162" dt="2024-11-11T01:35:05.497"/>
-  </p1510:revLst>
-</p1510:revInfo>
 </file>
 
 <file path=ppt/diagrams/colors1.xml><?xml version="1.0" encoding="utf-8"?>
@@ -16633,7 +16626,7 @@
           <a:p>
             <a:r>
               <a:rPr lang="en-VN" dirty="0"/>
-              <a:t>Cross-validation</a:t>
+              <a:t>Cross Validation</a:t>
             </a:r>
           </a:p>
         </p:txBody>
@@ -17455,7 +17448,7 @@
           <p:cNvPr id="2" name="Title 1">
             <a:extLst>
               <a:ext uri="{FF2B5EF4-FFF2-40B4-BE49-F238E27FC236}">
-                <a16:creationId xmlns:a16="http://schemas.microsoft.com/office/drawing/2014/main" id="{D43CBFBE-02E0-D28F-E531-2F39A4489BFD}"/>
+                <a16:creationId xmlns:a16="http://schemas.microsoft.com/office/drawing/2014/main" id="{82001974-2447-88FD-A30F-249E97CADC69}"/>
               </a:ext>
             </a:extLst>
           </p:cNvPr>
@@ -17472,120 +17465,47 @@
           <a:lstStyle/>
           <a:p>
             <a:r>
-              <a:rPr lang="en-US" dirty="0"/>
-              <a:t>Hyperparameter Tuning</a:t>
-            </a:r>
-            <a:endParaRPr lang="en-VN" dirty="0"/>
+              <a:rPr lang="en-VN" dirty="0"/>
+              <a:t>Cross Validation</a:t>
+            </a:r>
           </a:p>
         </p:txBody>
       </p:sp>
-      <p:sp>
-        <p:nvSpPr>
-          <p:cNvPr id="3" name="Content Placeholder 2">
-            <a:extLst>
-              <a:ext uri="{FF2B5EF4-FFF2-40B4-BE49-F238E27FC236}">
-                <a16:creationId xmlns:a16="http://schemas.microsoft.com/office/drawing/2014/main" id="{F4349DDE-70EB-7132-3ACF-ECD1B4669DF3}"/>
-              </a:ext>
-            </a:extLst>
-          </p:cNvPr>
-          <p:cNvSpPr>
-            <a:spLocks noGrp="1"/>
-          </p:cNvSpPr>
+      <p:pic>
+        <p:nvPicPr>
+          <p:cNvPr id="6" name="Content Placeholder 5" descr="A diagram of a train test&#10;&#10;Description automatically generated">
+            <a:extLst>
+              <a:ext uri="{FF2B5EF4-FFF2-40B4-BE49-F238E27FC236}">
+                <a16:creationId xmlns:a16="http://schemas.microsoft.com/office/drawing/2014/main" id="{6FFEAD34-66FE-2B12-9EEC-3212354E2B15}"/>
+              </a:ext>
+            </a:extLst>
+          </p:cNvPr>
+          <p:cNvPicPr>
+            <a:picLocks noGrp="1" noChangeAspect="1"/>
+          </p:cNvPicPr>
           <p:nvPr>
             <p:ph idx="1"/>
           </p:nvPr>
-        </p:nvSpPr>
-        <p:spPr/>
-        <p:txBody>
-          <a:bodyPr/>
-          <a:lstStyle/>
-          <a:p>
-            <a:pPr>
-              <a:buFont typeface="Arial" panose="020B0604020202020204" pitchFamily="34" charset="0"/>
-              <a:buChar char="•"/>
-            </a:pPr>
-            <a:r>
-              <a:rPr lang="en-US" b="1" dirty="0"/>
-              <a:t>Definition:</a:t>
-            </a:r>
-            <a:r>
-              <a:rPr lang="en-US" dirty="0"/>
-              <a:t> The process of optimizing model settings (hyperparameters) that aren’t learned from data, such as learning rate, number of neighbors (in k-NN), or max depth (in decision trees).</a:t>
-            </a:r>
-            <a:r>
-              <a:rPr lang="en-US" b="1" dirty="0"/>
-              <a:t>Goal:</a:t>
-            </a:r>
-            <a:r>
-              <a:rPr lang="en-US" dirty="0"/>
-              <a:t> To improve model accuracy, reduce overfitting, and achieve the best possible </a:t>
-            </a:r>
-            <a:r>
-              <a:rPr lang="en-US" dirty="0" err="1"/>
-              <a:t>performance.</a:t>
-            </a:r>
-            <a:r>
-              <a:rPr lang="en-US" b="1" dirty="0" err="1"/>
-              <a:t>Methods:Grid</a:t>
-            </a:r>
-            <a:r>
-              <a:rPr lang="en-US" b="1" dirty="0"/>
-              <a:t> Search:</a:t>
-            </a:r>
-            <a:r>
-              <a:rPr lang="en-US" dirty="0"/>
-              <a:t> Tests all possible combinations of hyperparameters within a predefined range.</a:t>
-            </a:r>
-          </a:p>
-          <a:p>
-            <a:pPr>
-              <a:buFont typeface="Arial" panose="020B0604020202020204" pitchFamily="34" charset="0"/>
-              <a:buChar char="•"/>
-            </a:pPr>
-            <a:r>
-              <a:rPr lang="en-US" b="1" dirty="0"/>
-              <a:t>Random Search:</a:t>
-            </a:r>
-            <a:r>
-              <a:rPr lang="en-US" dirty="0"/>
-              <a:t> Samples random combinations of hyperparameters, offering faster exploration.</a:t>
-            </a:r>
-          </a:p>
-          <a:p>
-            <a:r>
-              <a:rPr lang="en-US" b="1" dirty="0"/>
-              <a:t>Tools:</a:t>
-            </a:r>
-            <a:r>
-              <a:rPr lang="en-US" dirty="0"/>
-              <a:t> </a:t>
-            </a:r>
-            <a:r>
-              <a:rPr lang="en-US" dirty="0" err="1"/>
-              <a:t>GridSearchCV</a:t>
-            </a:r>
-            <a:r>
-              <a:rPr lang="en-US" dirty="0"/>
-              <a:t> and </a:t>
-            </a:r>
-            <a:r>
-              <a:rPr lang="en-US" dirty="0" err="1"/>
-              <a:t>RandomizedSearchCV</a:t>
-            </a:r>
-            <a:r>
-              <a:rPr lang="en-US" dirty="0"/>
-              <a:t> in scikit-learn.</a:t>
-            </a:r>
-            <a:endParaRPr lang="en-VN" dirty="0"/>
-          </a:p>
-        </p:txBody>
-      </p:sp>
+        </p:nvPicPr>
+        <p:blipFill>
+          <a:blip r:embed="rId2"/>
+          <a:stretch>
+            <a:fillRect/>
+          </a:stretch>
+        </p:blipFill>
+        <p:spPr>
+          <a:xfrm>
+            <a:off x="838200" y="1913002"/>
+            <a:ext cx="10515600" cy="4176583"/>
+          </a:xfrm>
+        </p:spPr>
+      </p:pic>
       <p:sp>
         <p:nvSpPr>
           <p:cNvPr id="4" name="Slide Number Placeholder 3">
             <a:extLst>
               <a:ext uri="{FF2B5EF4-FFF2-40B4-BE49-F238E27FC236}">
-                <a16:creationId xmlns:a16="http://schemas.microsoft.com/office/drawing/2014/main" id="{38E0695E-FE9E-F15C-1E62-6DDF8C664B78}"/>
+                <a16:creationId xmlns:a16="http://schemas.microsoft.com/office/drawing/2014/main" id="{7C355ABE-1AF5-5483-8EE2-0B9AC9182075}"/>
               </a:ext>
             </a:extLst>
           </p:cNvPr>
@@ -17609,10 +17529,118 @@
           </a:p>
         </p:txBody>
       </p:sp>
+      <p:sp>
+        <p:nvSpPr>
+          <p:cNvPr id="7" name="TextBox 6">
+            <a:extLst>
+              <a:ext uri="{FF2B5EF4-FFF2-40B4-BE49-F238E27FC236}">
+                <a16:creationId xmlns:a16="http://schemas.microsoft.com/office/drawing/2014/main" id="{1B4BBAE1-5069-D3BF-BB3B-8A07DCF4A828}"/>
+              </a:ext>
+            </a:extLst>
+          </p:cNvPr>
+          <p:cNvSpPr txBox="1"/>
+          <p:nvPr/>
+        </p:nvSpPr>
+        <p:spPr>
+          <a:xfrm>
+            <a:off x="838200" y="6311899"/>
+            <a:ext cx="3408497" cy="276999"/>
+          </a:xfrm>
+          <a:prstGeom prst="rect">
+            <a:avLst/>
+          </a:prstGeom>
+          <a:noFill/>
+        </p:spPr>
+        <p:txBody>
+          <a:bodyPr wrap="none" rtlCol="0">
+            <a:spAutoFit/>
+          </a:bodyPr>
+          <a:lstStyle/>
+          <a:p>
+            <a:r>
+              <a:rPr lang="en-VN" sz="1200" dirty="0">
+                <a:solidFill>
+                  <a:schemeClr val="bg1">
+                    <a:lumMod val="50000"/>
+                  </a:schemeClr>
+                </a:solidFill>
+              </a:rPr>
+              <a:t>Source: </a:t>
+            </a:r>
+            <a:r>
+              <a:rPr lang="en-US" sz="1200" dirty="0">
+                <a:solidFill>
+                  <a:schemeClr val="bg1">
+                    <a:lumMod val="50000"/>
+                  </a:schemeClr>
+                </a:solidFill>
+              </a:rPr>
+              <a:t>https://</a:t>
+            </a:r>
+            <a:r>
+              <a:rPr lang="en-US" sz="1200" dirty="0" err="1">
+                <a:solidFill>
+                  <a:schemeClr val="bg1">
+                    <a:lumMod val="50000"/>
+                  </a:schemeClr>
+                </a:solidFill>
+              </a:rPr>
+              <a:t>learningds.org</a:t>
+            </a:r>
+            <a:r>
+              <a:rPr lang="en-US" sz="1200" dirty="0">
+                <a:solidFill>
+                  <a:schemeClr val="bg1">
+                    <a:lumMod val="50000"/>
+                  </a:schemeClr>
+                </a:solidFill>
+              </a:rPr>
+              <a:t>/</a:t>
+            </a:r>
+            <a:r>
+              <a:rPr lang="en-US" sz="1200" dirty="0" err="1">
+                <a:solidFill>
+                  <a:schemeClr val="bg1">
+                    <a:lumMod val="50000"/>
+                  </a:schemeClr>
+                </a:solidFill>
+              </a:rPr>
+              <a:t>ch</a:t>
+            </a:r>
+            <a:r>
+              <a:rPr lang="en-US" sz="1200" dirty="0">
+                <a:solidFill>
+                  <a:schemeClr val="bg1">
+                    <a:lumMod val="50000"/>
+                  </a:schemeClr>
+                </a:solidFill>
+              </a:rPr>
+              <a:t>/16/</a:t>
+            </a:r>
+            <a:r>
+              <a:rPr lang="en-US" sz="1200" dirty="0" err="1">
+                <a:solidFill>
+                  <a:schemeClr val="bg1">
+                    <a:lumMod val="50000"/>
+                  </a:schemeClr>
+                </a:solidFill>
+              </a:rPr>
+              <a:t>ms_cv.html</a:t>
+            </a:r>
+            <a:endParaRPr lang="en-VN" sz="1200" dirty="0">
+              <a:solidFill>
+                <a:schemeClr val="bg1">
+                  <a:lumMod val="50000"/>
+                </a:schemeClr>
+              </a:solidFill>
+            </a:endParaRPr>
+          </a:p>
+        </p:txBody>
+      </p:sp>
     </p:spTree>
     <p:extLst>
       <p:ext uri="{BB962C8B-B14F-4D97-AF65-F5344CB8AC3E}">
-        <p14:creationId xmlns:p14="http://schemas.microsoft.com/office/powerpoint/2010/main" val="459032573"/>
+        <p14:creationId xmlns:p14="http://schemas.microsoft.com/office/powerpoint/2010/main" val="1092838255"/>
       </p:ext>
     </p:extLst>
   </p:cSld>
@@ -17644,7 +17672,7 @@
           <p:cNvPr id="2" name="Title 1">
             <a:extLst>
               <a:ext uri="{FF2B5EF4-FFF2-40B4-BE49-F238E27FC236}">
-                <a16:creationId xmlns:a16="http://schemas.microsoft.com/office/drawing/2014/main" id="{AED75082-2E6B-9622-E927-EAA0D44C46CD}"/>
+                <a16:creationId xmlns:a16="http://schemas.microsoft.com/office/drawing/2014/main" id="{D43CBFBE-02E0-D28F-E531-2F39A4489BFD}"/>
               </a:ext>
             </a:extLst>
           </p:cNvPr>
@@ -17662,7 +17690,7 @@
           <a:p>
             <a:r>
               <a:rPr lang="en-US" dirty="0"/>
-              <a:t>Ensemble Method</a:t>
+              <a:t>Hyperparameter Tuning</a:t>
             </a:r>
             <a:endParaRPr lang="en-VN" dirty="0"/>
           </a:p>
@@ -17673,7 +17701,7 @@
           <p:cNvPr id="3" name="Content Placeholder 2">
             <a:extLst>
               <a:ext uri="{FF2B5EF4-FFF2-40B4-BE49-F238E27FC236}">
-                <a16:creationId xmlns:a16="http://schemas.microsoft.com/office/drawing/2014/main" id="{E5C760FC-7DBB-AD40-43BC-7428F5BA4DE1}"/>
+                <a16:creationId xmlns:a16="http://schemas.microsoft.com/office/drawing/2014/main" id="{F4349DDE-70EB-7132-3ACF-ECD1B4669DF3}"/>
               </a:ext>
             </a:extLst>
           </p:cNvPr>
@@ -17701,7 +17729,7 @@
             </a:r>
             <a:r>
               <a:rPr lang="en-US" dirty="0"/>
-              <a:t> Combines multiple models to improve overall performance by reducing errors and capturing more complex patterns.</a:t>
+              <a:t> The process of optimizing model settings (hyperparameters) that aren’t learned from data, such as learning rate, number of neighbors (in k-NN), or max depth (in decision trees).</a:t>
             </a:r>
           </a:p>
           <a:p>
@@ -17711,50 +17739,69 @@
             </a:pPr>
             <a:r>
               <a:rPr lang="en-US" b="1" dirty="0"/>
-              <a:t>Types:</a:t>
+              <a:t>Goal:</a:t>
+            </a:r>
+            <a:r>
+              <a:rPr lang="en-US" dirty="0"/>
+              <a:t> To improve model accuracy, reduce overfitting, and achieve the best possible performance.</a:t>
+            </a:r>
+          </a:p>
+          <a:p>
+            <a:pPr>
+              <a:buFont typeface="Arial" panose="020B0604020202020204" pitchFamily="34" charset="0"/>
+              <a:buChar char="•"/>
+            </a:pPr>
+            <a:r>
+              <a:rPr lang="en-US" b="1" dirty="0"/>
+              <a:t>Methods:</a:t>
             </a:r>
           </a:p>
           <a:p>
             <a:pPr lvl="1"/>
             <a:r>
               <a:rPr lang="en-US" b="1" dirty="0"/>
-              <a:t>Bagging:</a:t>
+              <a:t>Grid Search:</a:t>
             </a:r>
             <a:r>
               <a:rPr lang="en-US" dirty="0"/>
-              <a:t> Trains multiple models on random subsets of data (e.g., Random Forest).</a:t>
+              <a:t> Tests all possible combinations of hyperparameters within a predefined range.</a:t>
             </a:r>
           </a:p>
           <a:p>
             <a:pPr lvl="1"/>
             <a:r>
               <a:rPr lang="en-US" b="1" dirty="0"/>
-              <a:t>Boosting:</a:t>
+              <a:t>Random Search:</a:t>
             </a:r>
             <a:r>
               <a:rPr lang="en-US" dirty="0"/>
-              <a:t> Sequentially trains models, each focusing on correcting errors from the previous one (e.g., AdaBoost, Gradient Boosting).</a:t>
-            </a:r>
-          </a:p>
-          <a:p>
-            <a:pPr lvl="1"/>
+              <a:t> Samples random combinations of hyperparameters, offering faster exploration.</a:t>
+            </a:r>
+          </a:p>
+          <a:p>
             <a:r>
               <a:rPr lang="en-US" b="1" dirty="0"/>
-              <a:t>Stacking:</a:t>
+              <a:t>Tools:</a:t>
             </a:r>
             <a:r>
               <a:rPr lang="en-US" dirty="0"/>
-              <a:t> Combines outputs of multiple models through a meta-model to improve predictions.</a:t>
-            </a:r>
-          </a:p>
-          <a:p>
-            <a:r>
-              <a:rPr lang="en-US" b="1" dirty="0"/>
-              <a:t>Benefits:</a:t>
+              <a:t> </a:t>
+            </a:r>
+            <a:r>
+              <a:rPr lang="en-US" dirty="0" err="1"/>
+              <a:t>GridSearchCV</a:t>
             </a:r>
             <a:r>
               <a:rPr lang="en-US" dirty="0"/>
-              <a:t> Increases accuracy, robustness, and generalization, often outperforming individual models.</a:t>
+              <a:t> and </a:t>
+            </a:r>
+            <a:r>
+              <a:rPr lang="en-US" dirty="0" err="1"/>
+              <a:t>RandomizedSearchCV</a:t>
+            </a:r>
+            <a:r>
+              <a:rPr lang="en-US" dirty="0"/>
+              <a:t> in scikit-learn.</a:t>
             </a:r>
             <a:endParaRPr lang="en-VN" dirty="0"/>
           </a:p>
@@ -17765,7 +17812,7 @@
           <p:cNvPr id="4" name="Slide Number Placeholder 3">
             <a:extLst>
               <a:ext uri="{FF2B5EF4-FFF2-40B4-BE49-F238E27FC236}">
-                <a16:creationId xmlns:a16="http://schemas.microsoft.com/office/drawing/2014/main" id="{1393FA27-C34F-1348-330B-88786FD84512}"/>
+                <a16:creationId xmlns:a16="http://schemas.microsoft.com/office/drawing/2014/main" id="{38E0695E-FE9E-F15C-1E62-6DDF8C664B78}"/>
               </a:ext>
             </a:extLst>
           </p:cNvPr>
@@ -17784,6 +17831,186 @@
             <a:fld id="{95F0C431-FB59-5241-9837-9D94F974831B}" type="slidenum">
               <a:rPr lang="en-VN" smtClean="0"/>
               <a:t>30</a:t>
+            </a:fld>
+            <a:endParaRPr lang="en-VN"/>
+          </a:p>
+        </p:txBody>
+      </p:sp>
+    </p:spTree>
+    <p:extLst>
+      <p:ext uri="{BB962C8B-B14F-4D97-AF65-F5344CB8AC3E}">
+        <p14:creationId xmlns:p14="http://schemas.microsoft.com/office/powerpoint/2010/main" val="459032573"/>
+      </p:ext>
+    </p:extLst>
+  </p:cSld>
+  <p:clrMapOvr>
+    <a:masterClrMapping/>
+  </p:clrMapOvr>
+</p:sld>
+</file>
+
+<file path=ppt/slides/slide32.xml><?xml version="1.0" encoding="utf-8"?>
+<p:sld xmlns:a="http://schemas.openxmlformats.org/drawingml/2006/main" xmlns:r="http://schemas.openxmlformats.org/officeDocument/2006/relationships" xmlns:p="http://schemas.openxmlformats.org/presentationml/2006/main">
+  <p:cSld>
+    <p:spTree>
+      <p:nvGrpSpPr>
+        <p:cNvPr id="1" name=""/>
+        <p:cNvGrpSpPr/>
+        <p:nvPr/>
+      </p:nvGrpSpPr>
+      <p:grpSpPr>
+        <a:xfrm>
+          <a:off x="0" y="0"/>
+          <a:ext cx="0" cy="0"/>
+          <a:chOff x="0" y="0"/>
+          <a:chExt cx="0" cy="0"/>
+        </a:xfrm>
+      </p:grpSpPr>
+      <p:sp>
+        <p:nvSpPr>
+          <p:cNvPr id="2" name="Title 1">
+            <a:extLst>
+              <a:ext uri="{FF2B5EF4-FFF2-40B4-BE49-F238E27FC236}">
+                <a16:creationId xmlns:a16="http://schemas.microsoft.com/office/drawing/2014/main" id="{AED75082-2E6B-9622-E927-EAA0D44C46CD}"/>
+              </a:ext>
+            </a:extLst>
+          </p:cNvPr>
+          <p:cNvSpPr>
+            <a:spLocks noGrp="1"/>
+          </p:cNvSpPr>
+          <p:nvPr>
+            <p:ph type="title"/>
+          </p:nvPr>
+        </p:nvSpPr>
+        <p:spPr/>
+        <p:txBody>
+          <a:bodyPr/>
+          <a:lstStyle/>
+          <a:p>
+            <a:r>
+              <a:rPr lang="en-US" dirty="0"/>
+              <a:t>Ensemble Method</a:t>
+            </a:r>
+            <a:endParaRPr lang="en-VN" dirty="0"/>
+          </a:p>
+        </p:txBody>
+      </p:sp>
+      <p:sp>
+        <p:nvSpPr>
+          <p:cNvPr id="3" name="Content Placeholder 2">
+            <a:extLst>
+              <a:ext uri="{FF2B5EF4-FFF2-40B4-BE49-F238E27FC236}">
+                <a16:creationId xmlns:a16="http://schemas.microsoft.com/office/drawing/2014/main" id="{E5C760FC-7DBB-AD40-43BC-7428F5BA4DE1}"/>
+              </a:ext>
+            </a:extLst>
+          </p:cNvPr>
+          <p:cNvSpPr>
+            <a:spLocks noGrp="1"/>
+          </p:cNvSpPr>
+          <p:nvPr>
+            <p:ph idx="1"/>
+          </p:nvPr>
+        </p:nvSpPr>
+        <p:spPr/>
+        <p:txBody>
+          <a:bodyPr>
+            <a:normAutofit fontScale="92500"/>
+          </a:bodyPr>
+          <a:lstStyle/>
+          <a:p>
+            <a:pPr>
+              <a:buFont typeface="Arial" panose="020B0604020202020204" pitchFamily="34" charset="0"/>
+              <a:buChar char="•"/>
+            </a:pPr>
+            <a:r>
+              <a:rPr lang="en-US" b="1" dirty="0"/>
+              <a:t>Definition:</a:t>
+            </a:r>
+            <a:r>
+              <a:rPr lang="en-US" dirty="0"/>
+              <a:t> Combines multiple models to improve overall performance by reducing errors and capturing more complex patterns.</a:t>
+            </a:r>
+          </a:p>
+          <a:p>
+            <a:pPr>
+              <a:buFont typeface="Arial" panose="020B0604020202020204" pitchFamily="34" charset="0"/>
+              <a:buChar char="•"/>
+            </a:pPr>
+            <a:r>
+              <a:rPr lang="en-US" b="1" dirty="0"/>
+              <a:t>Types:</a:t>
+            </a:r>
+          </a:p>
+          <a:p>
+            <a:pPr lvl="1"/>
+            <a:r>
+              <a:rPr lang="en-US" b="1" dirty="0"/>
+              <a:t>Bagging:</a:t>
+            </a:r>
+            <a:r>
+              <a:rPr lang="en-US" dirty="0"/>
+              <a:t> Trains multiple models on random subsets of data (e.g., Random Forest).</a:t>
+            </a:r>
+          </a:p>
+          <a:p>
+            <a:pPr lvl="1"/>
+            <a:r>
+              <a:rPr lang="en-US" b="1" dirty="0"/>
+              <a:t>Boosting:</a:t>
+            </a:r>
+            <a:r>
+              <a:rPr lang="en-US" dirty="0"/>
+              <a:t> Sequentially trains models, each focusing on correcting errors from the previous one (e.g., AdaBoost, Gradient Boosting).</a:t>
+            </a:r>
+          </a:p>
+          <a:p>
+            <a:pPr lvl="1"/>
+            <a:r>
+              <a:rPr lang="en-US" b="1" dirty="0"/>
+              <a:t>Stacking:</a:t>
+            </a:r>
+            <a:r>
+              <a:rPr lang="en-US" dirty="0"/>
+              <a:t> Combines outputs of multiple models through a meta-model to improve predictions.</a:t>
+            </a:r>
+          </a:p>
+          <a:p>
+            <a:r>
+              <a:rPr lang="en-US" b="1" dirty="0"/>
+              <a:t>Benefits:</a:t>
+            </a:r>
+            <a:r>
+              <a:rPr lang="en-US" dirty="0"/>
+              <a:t> Increases accuracy, robustness, and generalization, often outperforming individual models.</a:t>
+            </a:r>
+            <a:endParaRPr lang="en-VN" dirty="0"/>
+          </a:p>
+        </p:txBody>
+      </p:sp>
+      <p:sp>
+        <p:nvSpPr>
+          <p:cNvPr id="4" name="Slide Number Placeholder 3">
+            <a:extLst>
+              <a:ext uri="{FF2B5EF4-FFF2-40B4-BE49-F238E27FC236}">
+                <a16:creationId xmlns:a16="http://schemas.microsoft.com/office/drawing/2014/main" id="{1393FA27-C34F-1348-330B-88786FD84512}"/>
+              </a:ext>
+            </a:extLst>
+          </p:cNvPr>
+          <p:cNvSpPr>
+            <a:spLocks noGrp="1"/>
+          </p:cNvSpPr>
+          <p:nvPr>
+            <p:ph type="sldNum" sz="quarter" idx="12"/>
+          </p:nvPr>
+        </p:nvSpPr>
+        <p:spPr/>
+        <p:txBody>
+          <a:bodyPr/>
+          <a:lstStyle/>
+          <a:p>
+            <a:fld id="{95F0C431-FB59-5241-9837-9D94F974831B}" type="slidenum">
+              <a:rPr lang="en-VN" smtClean="0"/>
+              <a:t>31</a:t>
             </a:fld>
             <a:endParaRPr lang="en-VN"/>
           </a:p>
@@ -17802,7 +18029,7 @@
 </p:sld>
 </file>
 
-<file path=ppt/slides/slide32.xml><?xml version="1.0" encoding="utf-8"?>
+<file path=ppt/slides/slide33.xml><?xml version="1.0" encoding="utf-8"?>
 <p:sld xmlns:a="http://schemas.openxmlformats.org/drawingml/2006/main" xmlns:r="http://schemas.openxmlformats.org/officeDocument/2006/relationships" xmlns:p="http://schemas.openxmlformats.org/presentationml/2006/main">
   <p:cSld>
     <p:bg>
@@ -18202,7 +18429,7 @@
                   <a:spcPts val="600"/>
                 </a:spcAft>
               </a:pPr>
-              <a:t>31</a:t>
+              <a:t>32</a:t>
             </a:fld>
             <a:endParaRPr lang="en-US" sz="6600">
               <a:solidFill>
@@ -18216,191 +18443,6 @@
     <p:extLst>
       <p:ext uri="{BB962C8B-B14F-4D97-AF65-F5344CB8AC3E}">
         <p14:creationId xmlns:p14="http://schemas.microsoft.com/office/powerpoint/2010/main" val="247892346"/>
-      </p:ext>
-    </p:extLst>
-  </p:cSld>
-  <p:clrMapOvr>
-    <a:masterClrMapping/>
-  </p:clrMapOvr>
-</p:sld>
-</file>
-
-<file path=ppt/slides/slide33.xml><?xml version="1.0" encoding="utf-8"?>
-<p:sld xmlns:a="http://schemas.openxmlformats.org/drawingml/2006/main" xmlns:r="http://schemas.openxmlformats.org/officeDocument/2006/relationships" xmlns:p="http://schemas.openxmlformats.org/presentationml/2006/main">
-  <p:cSld>
-    <p:spTree>
-      <p:nvGrpSpPr>
-        <p:cNvPr id="1" name=""/>
-        <p:cNvGrpSpPr/>
-        <p:nvPr/>
-      </p:nvGrpSpPr>
-      <p:grpSpPr>
-        <a:xfrm>
-          <a:off x="0" y="0"/>
-          <a:ext cx="0" cy="0"/>
-          <a:chOff x="0" y="0"/>
-          <a:chExt cx="0" cy="0"/>
-        </a:xfrm>
-      </p:grpSpPr>
-      <p:sp>
-        <p:nvSpPr>
-          <p:cNvPr id="2" name="Title 1">
-            <a:extLst>
-              <a:ext uri="{FF2B5EF4-FFF2-40B4-BE49-F238E27FC236}">
-                <a16:creationId xmlns:a16="http://schemas.microsoft.com/office/drawing/2014/main" id="{6ECC1FA0-BC3C-D9E3-5888-B42873FB9760}"/>
-              </a:ext>
-            </a:extLst>
-          </p:cNvPr>
-          <p:cNvSpPr>
-            <a:spLocks noGrp="1"/>
-          </p:cNvSpPr>
-          <p:nvPr>
-            <p:ph type="title"/>
-          </p:nvPr>
-        </p:nvSpPr>
-        <p:spPr/>
-        <p:txBody>
-          <a:bodyPr/>
-          <a:lstStyle/>
-          <a:p>
-            <a:r>
-              <a:rPr lang="en-VN" dirty="0"/>
-              <a:t>Sources to learn ML</a:t>
-            </a:r>
-          </a:p>
-        </p:txBody>
-      </p:sp>
-      <p:sp>
-        <p:nvSpPr>
-          <p:cNvPr id="3" name="Content Placeholder 2">
-            <a:extLst>
-              <a:ext uri="{FF2B5EF4-FFF2-40B4-BE49-F238E27FC236}">
-                <a16:creationId xmlns:a16="http://schemas.microsoft.com/office/drawing/2014/main" id="{66EB9D5E-4DEE-1A54-E196-9F7F710B5117}"/>
-              </a:ext>
-            </a:extLst>
-          </p:cNvPr>
-          <p:cNvSpPr>
-            <a:spLocks noGrp="1"/>
-          </p:cNvSpPr>
-          <p:nvPr>
-            <p:ph idx="1"/>
-          </p:nvPr>
-        </p:nvSpPr>
-        <p:spPr/>
-        <p:txBody>
-          <a:bodyPr/>
-          <a:lstStyle/>
-          <a:p>
-            <a:r>
-              <a:rPr lang="en-VN" dirty="0"/>
-              <a:t>Scikit learn: </a:t>
-            </a:r>
-            <a:r>
-              <a:rPr lang="en-US" dirty="0"/>
-              <a:t>https://scikit-</a:t>
-            </a:r>
-            <a:r>
-              <a:rPr lang="en-US" dirty="0" err="1"/>
-              <a:t>learn.org</a:t>
-            </a:r>
-            <a:r>
-              <a:rPr lang="en-US" dirty="0"/>
-              <a:t>/stable/</a:t>
-            </a:r>
-            <a:endParaRPr lang="en-VN" dirty="0"/>
-          </a:p>
-          <a:p>
-            <a:r>
-              <a:rPr lang="en-VN" dirty="0"/>
-              <a:t>Kaggle: </a:t>
-            </a:r>
-            <a:r>
-              <a:rPr lang="en-US" dirty="0">
-                <a:hlinkClick r:id="rId2"/>
-              </a:rPr>
-              <a:t>https://www.kaggle.com/</a:t>
-            </a:r>
-            <a:endParaRPr lang="en-US" dirty="0"/>
-          </a:p>
-          <a:p>
-            <a:r>
-              <a:rPr lang="en-US" dirty="0"/>
-              <a:t>Machine Learning Mastery: </a:t>
-            </a:r>
-            <a:r>
-              <a:rPr lang="en-US" dirty="0">
-                <a:hlinkClick r:id="rId3"/>
-              </a:rPr>
-              <a:t>https://machinelearningmastery.com/</a:t>
-            </a:r>
-            <a:endParaRPr lang="en-US" dirty="0"/>
-          </a:p>
-          <a:p>
-            <a:r>
-              <a:rPr lang="en-VN" dirty="0"/>
-              <a:t>Books: </a:t>
-            </a:r>
-            <a:r>
-              <a:rPr lang="en-US" dirty="0"/>
-              <a:t>https://</a:t>
-            </a:r>
-            <a:r>
-              <a:rPr lang="en-US" dirty="0" err="1"/>
-              <a:t>github.com</a:t>
-            </a:r>
-            <a:r>
-              <a:rPr lang="en-US" dirty="0"/>
-              <a:t>/</a:t>
-            </a:r>
-            <a:r>
-              <a:rPr lang="en-US" dirty="0" err="1"/>
-              <a:t>josephmisiti</a:t>
-            </a:r>
-            <a:r>
-              <a:rPr lang="en-US" dirty="0"/>
-              <a:t>/awesome-machine-learning/blob/master/</a:t>
-            </a:r>
-            <a:r>
-              <a:rPr lang="en-US" dirty="0" err="1"/>
-              <a:t>books.md</a:t>
-            </a:r>
-            <a:endParaRPr lang="en-VN" dirty="0"/>
-          </a:p>
-        </p:txBody>
-      </p:sp>
-      <p:sp>
-        <p:nvSpPr>
-          <p:cNvPr id="4" name="Slide Number Placeholder 3">
-            <a:extLst>
-              <a:ext uri="{FF2B5EF4-FFF2-40B4-BE49-F238E27FC236}">
-                <a16:creationId xmlns:a16="http://schemas.microsoft.com/office/drawing/2014/main" id="{EDB44B04-3812-72F2-3736-C7B44ED16D53}"/>
-              </a:ext>
-            </a:extLst>
-          </p:cNvPr>
-          <p:cNvSpPr>
-            <a:spLocks noGrp="1"/>
-          </p:cNvSpPr>
-          <p:nvPr>
-            <p:ph type="sldNum" sz="quarter" idx="12"/>
-          </p:nvPr>
-        </p:nvSpPr>
-        <p:spPr/>
-        <p:txBody>
-          <a:bodyPr/>
-          <a:lstStyle/>
-          <a:p>
-            <a:fld id="{95F0C431-FB59-5241-9837-9D94F974831B}" type="slidenum">
-              <a:rPr lang="en-VN" smtClean="0"/>
-              <a:t>32</a:t>
-            </a:fld>
-            <a:endParaRPr lang="en-VN"/>
-          </a:p>
-        </p:txBody>
-      </p:sp>
-    </p:spTree>
-    <p:extLst>
-      <p:ext uri="{BB962C8B-B14F-4D97-AF65-F5344CB8AC3E}">
-        <p14:creationId xmlns:p14="http://schemas.microsoft.com/office/powerpoint/2010/main" val="2017571403"/>
       </p:ext>
     </p:extLst>
   </p:cSld>
@@ -18432,7 +18474,7 @@
           <p:cNvPr id="2" name="Title 1">
             <a:extLst>
               <a:ext uri="{FF2B5EF4-FFF2-40B4-BE49-F238E27FC236}">
-                <a16:creationId xmlns:a16="http://schemas.microsoft.com/office/drawing/2014/main" id="{1436870D-A77D-E76B-FF97-DD2BE7D9502C}"/>
+                <a16:creationId xmlns:a16="http://schemas.microsoft.com/office/drawing/2014/main" id="{6ECC1FA0-BC3C-D9E3-5888-B42873FB9760}"/>
               </a:ext>
             </a:extLst>
           </p:cNvPr>
@@ -18450,7 +18492,7 @@
           <a:p>
             <a:r>
               <a:rPr lang="en-VN" dirty="0"/>
-              <a:t>Lab</a:t>
+              <a:t>Sources to learn ML</a:t>
             </a:r>
           </a:p>
         </p:txBody>
@@ -18460,7 +18502,7 @@
           <p:cNvPr id="3" name="Content Placeholder 2">
             <a:extLst>
               <a:ext uri="{FF2B5EF4-FFF2-40B4-BE49-F238E27FC236}">
-                <a16:creationId xmlns:a16="http://schemas.microsoft.com/office/drawing/2014/main" id="{354D9D8A-1A78-3247-D0B2-59E715C918C4}"/>
+                <a16:creationId xmlns:a16="http://schemas.microsoft.com/office/drawing/2014/main" id="{66EB9D5E-4DEE-1A54-E196-9F7F710B5117}"/>
               </a:ext>
             </a:extLst>
           </p:cNvPr>
@@ -18476,12 +18518,54 @@
           <a:bodyPr/>
           <a:lstStyle/>
           <a:p>
-            <a:pPr marL="0" indent="0">
-              <a:buNone/>
-            </a:pPr>
             <a:r>
               <a:rPr lang="en-VN" dirty="0"/>
-              <a:t>Link: </a:t>
+              <a:t>Scikit learn: </a:t>
+            </a:r>
+            <a:r>
+              <a:rPr lang="en-US" dirty="0"/>
+              <a:t>https://scikit-</a:t>
+            </a:r>
+            <a:r>
+              <a:rPr lang="en-US" dirty="0" err="1"/>
+              <a:t>learn.org</a:t>
+            </a:r>
+            <a:r>
+              <a:rPr lang="en-US" dirty="0"/>
+              <a:t>/stable/</a:t>
+            </a:r>
+            <a:endParaRPr lang="en-VN" dirty="0"/>
+          </a:p>
+          <a:p>
+            <a:r>
+              <a:rPr lang="en-VN" dirty="0"/>
+              <a:t>Kaggle: </a:t>
+            </a:r>
+            <a:r>
+              <a:rPr lang="en-US" dirty="0">
+                <a:hlinkClick r:id="rId2"/>
+              </a:rPr>
+              <a:t>https://www.kaggle.com/</a:t>
+            </a:r>
+            <a:endParaRPr lang="en-US" dirty="0"/>
+          </a:p>
+          <a:p>
+            <a:r>
+              <a:rPr lang="en-US" dirty="0"/>
+              <a:t>Machine Learning Mastery: </a:t>
+            </a:r>
+            <a:r>
+              <a:rPr lang="en-US" dirty="0">
+                <a:hlinkClick r:id="rId3"/>
+              </a:rPr>
+              <a:t>https://machinelearningmastery.com/</a:t>
+            </a:r>
+            <a:endParaRPr lang="en-US" dirty="0"/>
+          </a:p>
+          <a:p>
+            <a:r>
+              <a:rPr lang="en-VN" dirty="0"/>
+              <a:t>Books: </a:t>
             </a:r>
             <a:r>
               <a:rPr lang="en-US" dirty="0"/>
@@ -18497,11 +18581,15 @@
             </a:r>
             <a:r>
               <a:rPr lang="en-US" dirty="0" err="1"/>
-              <a:t>luumsk</a:t>
+              <a:t>josephmisiti</a:t>
             </a:r>
             <a:r>
               <a:rPr lang="en-US" dirty="0"/>
-              <a:t>/NSU_ML/blob/main/Labs/lab1.ipynb</a:t>
+              <a:t>/awesome-machine-learning/blob/master/</a:t>
+            </a:r>
+            <a:r>
+              <a:rPr lang="en-US" dirty="0" err="1"/>
+              <a:t>books.md</a:t>
             </a:r>
             <a:endParaRPr lang="en-VN" dirty="0"/>
           </a:p>
@@ -18512,7 +18600,7 @@
           <p:cNvPr id="4" name="Slide Number Placeholder 3">
             <a:extLst>
               <a:ext uri="{FF2B5EF4-FFF2-40B4-BE49-F238E27FC236}">
-                <a16:creationId xmlns:a16="http://schemas.microsoft.com/office/drawing/2014/main" id="{DC6BD58E-6645-02FB-84E7-339D24C17C8F}"/>
+                <a16:creationId xmlns:a16="http://schemas.microsoft.com/office/drawing/2014/main" id="{EDB44B04-3812-72F2-3736-C7B44ED16D53}"/>
               </a:ext>
             </a:extLst>
           </p:cNvPr>
@@ -18539,7 +18627,7 @@
     </p:spTree>
     <p:extLst>
       <p:ext uri="{BB962C8B-B14F-4D97-AF65-F5344CB8AC3E}">
-        <p14:creationId xmlns:p14="http://schemas.microsoft.com/office/powerpoint/2010/main" val="3781532505"/>
+        <p14:creationId xmlns:p14="http://schemas.microsoft.com/office/powerpoint/2010/main" val="2017571403"/>
       </p:ext>
     </p:extLst>
   </p:cSld>
@@ -18571,7 +18659,7 @@
           <p:cNvPr id="2" name="Title 1">
             <a:extLst>
               <a:ext uri="{FF2B5EF4-FFF2-40B4-BE49-F238E27FC236}">
-                <a16:creationId xmlns:a16="http://schemas.microsoft.com/office/drawing/2014/main" id="{5E19F4C2-D96A-2E13-0D68-7A68083CF9E1}"/>
+                <a16:creationId xmlns:a16="http://schemas.microsoft.com/office/drawing/2014/main" id="{1436870D-A77D-E76B-FF97-DD2BE7D9502C}"/>
               </a:ext>
             </a:extLst>
           </p:cNvPr>
@@ -18589,7 +18677,7 @@
           <a:p>
             <a:r>
               <a:rPr lang="en-VN" dirty="0"/>
-              <a:t>References</a:t>
+              <a:t>Lab</a:t>
             </a:r>
           </a:p>
         </p:txBody>
@@ -18599,7 +18687,7 @@
           <p:cNvPr id="3" name="Content Placeholder 2">
             <a:extLst>
               <a:ext uri="{FF2B5EF4-FFF2-40B4-BE49-F238E27FC236}">
-                <a16:creationId xmlns:a16="http://schemas.microsoft.com/office/drawing/2014/main" id="{9E6E67B8-213A-763F-A472-1E8300A722EA}"/>
+                <a16:creationId xmlns:a16="http://schemas.microsoft.com/office/drawing/2014/main" id="{354D9D8A-1A78-3247-D0B2-59E715C918C4}"/>
               </a:ext>
             </a:extLst>
           </p:cNvPr>
@@ -18612,111 +18700,35 @@
         </p:nvSpPr>
         <p:spPr/>
         <p:txBody>
-          <a:bodyPr>
-            <a:normAutofit lnSpcReduction="10000"/>
-          </a:bodyPr>
+          <a:bodyPr/>
           <a:lstStyle/>
           <a:p>
-            <a:r>
-              <a:rPr lang="en-US" dirty="0">
-                <a:hlinkClick r:id="rId2"/>
-              </a:rPr>
-              <a:t>https://acropolium.com/blog/machine-learning-in-healthcare-use-cases-benefits-and-success-stories/</a:t>
-            </a:r>
-            <a:endParaRPr lang="en-US" dirty="0"/>
-          </a:p>
-          <a:p>
-            <a:r>
-              <a:rPr lang="en-US" dirty="0">
-                <a:hlinkClick r:id="rId3"/>
-              </a:rPr>
-              <a:t>https://www.enjoyalgorithms.com/blogs/classification-and-regression-in-machine-learning</a:t>
-            </a:r>
-            <a:endParaRPr lang="en-US" dirty="0"/>
-          </a:p>
-          <a:p>
-            <a:r>
-              <a:rPr lang="en-US" dirty="0">
-                <a:hlinkClick r:id="rId4"/>
-              </a:rPr>
-              <a:t>https://hands-on.cloud/ml-unsupervised-learning-guide/</a:t>
-            </a:r>
-            <a:endParaRPr lang="en-US" dirty="0"/>
-          </a:p>
-          <a:p>
-            <a:r>
-              <a:rPr lang="en-US" dirty="0">
-                <a:hlinkClick r:id="rId5"/>
-              </a:rPr>
-              <a:t>https://medium.com/analytics-vidhya/beginners-guide-to-unsupervised-learning-76a575c4e942</a:t>
-            </a:r>
-            <a:endParaRPr lang="en-US" dirty="0"/>
-          </a:p>
-          <a:p>
-            <a:r>
-              <a:rPr lang="en-US" sz="2800" dirty="0">
-                <a:solidFill>
-                  <a:schemeClr val="bg1">
-                    <a:lumMod val="50000"/>
-                  </a:schemeClr>
-                </a:solidFill>
-              </a:rPr>
-              <a:t>https://</a:t>
-            </a:r>
-            <a:r>
-              <a:rPr lang="en-US" sz="2800" dirty="0" err="1">
-                <a:solidFill>
-                  <a:schemeClr val="bg1">
-                    <a:lumMod val="50000"/>
-                  </a:schemeClr>
-                </a:solidFill>
-              </a:rPr>
-              <a:t>www.erieri.com</a:t>
-            </a:r>
-            <a:r>
-              <a:rPr lang="en-US" sz="2800" dirty="0">
-                <a:solidFill>
-                  <a:schemeClr val="bg1">
-                    <a:lumMod val="50000"/>
-                  </a:schemeClr>
-                </a:solidFill>
-              </a:rPr>
-              <a:t>/salary/job/machine-learning-engineer/</a:t>
-            </a:r>
-            <a:r>
-              <a:rPr lang="en-US" sz="2800" dirty="0" err="1">
-                <a:solidFill>
-                  <a:schemeClr val="bg1">
-                    <a:lumMod val="50000"/>
-                  </a:schemeClr>
-                </a:solidFill>
-              </a:rPr>
-              <a:t>russian</a:t>
-            </a:r>
-            <a:r>
-              <a:rPr lang="en-US" sz="2800" dirty="0">
-                <a:solidFill>
-                  <a:schemeClr val="bg1">
-                    <a:lumMod val="50000"/>
-                  </a:schemeClr>
-                </a:solidFill>
-              </a:rPr>
-              <a:t>-federation</a:t>
-            </a:r>
-            <a:endParaRPr lang="en-US" dirty="0"/>
-          </a:p>
-          <a:p>
+            <a:pPr marL="0" indent="0">
+              <a:buNone/>
+            </a:pPr>
+            <a:r>
+              <a:rPr lang="en-VN" dirty="0"/>
+              <a:t>Link: </a:t>
+            </a:r>
             <a:r>
               <a:rPr lang="en-US" dirty="0"/>
               <a:t>https://</a:t>
             </a:r>
             <a:r>
               <a:rPr lang="en-US" dirty="0" err="1"/>
-              <a:t>www.tealhq.com</a:t>
+              <a:t>github.com</a:t>
             </a:r>
             <a:r>
               <a:rPr lang="en-US" dirty="0"/>
-              <a:t>/job-titles/machine-learning-scientist</a:t>
+              <a:t>/</a:t>
+            </a:r>
+            <a:r>
+              <a:rPr lang="en-US" dirty="0" err="1"/>
+              <a:t>luumsk</a:t>
+            </a:r>
+            <a:r>
+              <a:rPr lang="en-US" dirty="0"/>
+              <a:t>/NSU_ML/blob/main/Labs/lab1.ipynb</a:t>
             </a:r>
             <a:endParaRPr lang="en-VN" dirty="0"/>
           </a:p>
@@ -18727,7 +18739,7 @@
           <p:cNvPr id="4" name="Slide Number Placeholder 3">
             <a:extLst>
               <a:ext uri="{FF2B5EF4-FFF2-40B4-BE49-F238E27FC236}">
-                <a16:creationId xmlns:a16="http://schemas.microsoft.com/office/drawing/2014/main" id="{4F8031CC-9613-4F5B-EADA-F192D688BA6F}"/>
+                <a16:creationId xmlns:a16="http://schemas.microsoft.com/office/drawing/2014/main" id="{DC6BD58E-6645-02FB-84E7-339D24C17C8F}"/>
               </a:ext>
             </a:extLst>
           </p:cNvPr>
@@ -18746,6 +18758,242 @@
             <a:fld id="{95F0C431-FB59-5241-9837-9D94F974831B}" type="slidenum">
               <a:rPr lang="en-VN" smtClean="0"/>
               <a:t>34</a:t>
+            </a:fld>
+            <a:endParaRPr lang="en-VN"/>
+          </a:p>
+        </p:txBody>
+      </p:sp>
+    </p:spTree>
+    <p:extLst>
+      <p:ext uri="{BB962C8B-B14F-4D97-AF65-F5344CB8AC3E}">
+        <p14:creationId xmlns:p14="http://schemas.microsoft.com/office/powerpoint/2010/main" val="3781532505"/>
+      </p:ext>
+    </p:extLst>
+  </p:cSld>
+  <p:clrMapOvr>
+    <a:masterClrMapping/>
+  </p:clrMapOvr>
+</p:sld>
+</file>
+
+<file path=ppt/slides/slide36.xml><?xml version="1.0" encoding="utf-8"?>
+<p:sld xmlns:a="http://schemas.openxmlformats.org/drawingml/2006/main" xmlns:r="http://schemas.openxmlformats.org/officeDocument/2006/relationships" xmlns:p="http://schemas.openxmlformats.org/presentationml/2006/main">
+  <p:cSld>
+    <p:spTree>
+      <p:nvGrpSpPr>
+        <p:cNvPr id="1" name=""/>
+        <p:cNvGrpSpPr/>
+        <p:nvPr/>
+      </p:nvGrpSpPr>
+      <p:grpSpPr>
+        <a:xfrm>
+          <a:off x="0" y="0"/>
+          <a:ext cx="0" cy="0"/>
+          <a:chOff x="0" y="0"/>
+          <a:chExt cx="0" cy="0"/>
+        </a:xfrm>
+      </p:grpSpPr>
+      <p:sp>
+        <p:nvSpPr>
+          <p:cNvPr id="2" name="Title 1">
+            <a:extLst>
+              <a:ext uri="{FF2B5EF4-FFF2-40B4-BE49-F238E27FC236}">
+                <a16:creationId xmlns:a16="http://schemas.microsoft.com/office/drawing/2014/main" id="{5E19F4C2-D96A-2E13-0D68-7A68083CF9E1}"/>
+              </a:ext>
+            </a:extLst>
+          </p:cNvPr>
+          <p:cNvSpPr>
+            <a:spLocks noGrp="1"/>
+          </p:cNvSpPr>
+          <p:nvPr>
+            <p:ph type="title"/>
+          </p:nvPr>
+        </p:nvSpPr>
+        <p:spPr/>
+        <p:txBody>
+          <a:bodyPr/>
+          <a:lstStyle/>
+          <a:p>
+            <a:r>
+              <a:rPr lang="en-VN" dirty="0"/>
+              <a:t>References</a:t>
+            </a:r>
+          </a:p>
+        </p:txBody>
+      </p:sp>
+      <p:sp>
+        <p:nvSpPr>
+          <p:cNvPr id="3" name="Content Placeholder 2">
+            <a:extLst>
+              <a:ext uri="{FF2B5EF4-FFF2-40B4-BE49-F238E27FC236}">
+                <a16:creationId xmlns:a16="http://schemas.microsoft.com/office/drawing/2014/main" id="{9E6E67B8-213A-763F-A472-1E8300A722EA}"/>
+              </a:ext>
+            </a:extLst>
+          </p:cNvPr>
+          <p:cNvSpPr>
+            <a:spLocks noGrp="1"/>
+          </p:cNvSpPr>
+          <p:nvPr>
+            <p:ph idx="1"/>
+          </p:nvPr>
+        </p:nvSpPr>
+        <p:spPr/>
+        <p:txBody>
+          <a:bodyPr>
+            <a:normAutofit fontScale="92500" lnSpcReduction="20000"/>
+          </a:bodyPr>
+          <a:lstStyle/>
+          <a:p>
+            <a:r>
+              <a:rPr lang="en-US" dirty="0">
+                <a:hlinkClick r:id="rId2"/>
+              </a:rPr>
+              <a:t>https://acropolium.com/blog/machine-learning-in-healthcare-use-cases-benefits-and-success-stories/</a:t>
+            </a:r>
+            <a:endParaRPr lang="en-US" dirty="0"/>
+          </a:p>
+          <a:p>
+            <a:r>
+              <a:rPr lang="en-US" dirty="0">
+                <a:hlinkClick r:id="rId3"/>
+              </a:rPr>
+              <a:t>https://www.enjoyalgorithms.com/blogs/classification-and-regression-in-machine-learning</a:t>
+            </a:r>
+            <a:endParaRPr lang="en-US" dirty="0"/>
+          </a:p>
+          <a:p>
+            <a:r>
+              <a:rPr lang="en-US" dirty="0">
+                <a:hlinkClick r:id="rId4"/>
+              </a:rPr>
+              <a:t>https://hands-on.cloud/ml-unsupervised-learning-guide/</a:t>
+            </a:r>
+            <a:endParaRPr lang="en-US" dirty="0"/>
+          </a:p>
+          <a:p>
+            <a:r>
+              <a:rPr lang="en-US" dirty="0">
+                <a:hlinkClick r:id="rId5"/>
+              </a:rPr>
+              <a:t>https://medium.com/analytics-vidhya/beginners-guide-to-unsupervised-learning-76a575c4e942</a:t>
+            </a:r>
+            <a:endParaRPr lang="en-US" dirty="0"/>
+          </a:p>
+          <a:p>
+            <a:r>
+              <a:rPr lang="en-US" sz="2800" dirty="0">
+                <a:solidFill>
+                  <a:schemeClr val="bg1">
+                    <a:lumMod val="50000"/>
+                  </a:schemeClr>
+                </a:solidFill>
+              </a:rPr>
+              <a:t>https://</a:t>
+            </a:r>
+            <a:r>
+              <a:rPr lang="en-US" sz="2800" dirty="0" err="1">
+                <a:solidFill>
+                  <a:schemeClr val="bg1">
+                    <a:lumMod val="50000"/>
+                  </a:schemeClr>
+                </a:solidFill>
+              </a:rPr>
+              <a:t>www.erieri.com</a:t>
+            </a:r>
+            <a:r>
+              <a:rPr lang="en-US" sz="2800" dirty="0">
+                <a:solidFill>
+                  <a:schemeClr val="bg1">
+                    <a:lumMod val="50000"/>
+                  </a:schemeClr>
+                </a:solidFill>
+              </a:rPr>
+              <a:t>/salary/job/machine-learning-engineer/</a:t>
+            </a:r>
+            <a:r>
+              <a:rPr lang="en-US" sz="2800" dirty="0" err="1">
+                <a:solidFill>
+                  <a:schemeClr val="bg1">
+                    <a:lumMod val="50000"/>
+                  </a:schemeClr>
+                </a:solidFill>
+              </a:rPr>
+              <a:t>russian</a:t>
+            </a:r>
+            <a:r>
+              <a:rPr lang="en-US" sz="2800" dirty="0">
+                <a:solidFill>
+                  <a:schemeClr val="bg1">
+                    <a:lumMod val="50000"/>
+                  </a:schemeClr>
+                </a:solidFill>
+              </a:rPr>
+              <a:t>-federation</a:t>
+            </a:r>
+            <a:endParaRPr lang="en-US" dirty="0"/>
+          </a:p>
+          <a:p>
+            <a:r>
+              <a:rPr lang="en-US" dirty="0">
+                <a:hlinkClick r:id="rId6"/>
+              </a:rPr>
+              <a:t>https://www.tealhq.com/job-titles/machine-learning-scientist</a:t>
+            </a:r>
+            <a:endParaRPr lang="en-US" dirty="0"/>
+          </a:p>
+          <a:p>
+            <a:r>
+              <a:rPr lang="en-US" dirty="0"/>
+              <a:t>https://</a:t>
+            </a:r>
+            <a:r>
+              <a:rPr lang="en-US" dirty="0" err="1"/>
+              <a:t>learningds.org</a:t>
+            </a:r>
+            <a:r>
+              <a:rPr lang="en-US" dirty="0"/>
+              <a:t>/</a:t>
+            </a:r>
+            <a:r>
+              <a:rPr lang="en-US" dirty="0" err="1"/>
+              <a:t>ch</a:t>
+            </a:r>
+            <a:r>
+              <a:rPr lang="en-US" dirty="0"/>
+              <a:t>/16/</a:t>
+            </a:r>
+            <a:r>
+              <a:rPr lang="en-US" dirty="0" err="1"/>
+              <a:t>ms_cv.html</a:t>
+            </a:r>
+            <a:endParaRPr lang="en-VN" dirty="0"/>
+          </a:p>
+        </p:txBody>
+      </p:sp>
+      <p:sp>
+        <p:nvSpPr>
+          <p:cNvPr id="4" name="Slide Number Placeholder 3">
+            <a:extLst>
+              <a:ext uri="{FF2B5EF4-FFF2-40B4-BE49-F238E27FC236}">
+                <a16:creationId xmlns:a16="http://schemas.microsoft.com/office/drawing/2014/main" id="{4F8031CC-9613-4F5B-EADA-F192D688BA6F}"/>
+              </a:ext>
+            </a:extLst>
+          </p:cNvPr>
+          <p:cNvSpPr>
+            <a:spLocks noGrp="1"/>
+          </p:cNvSpPr>
+          <p:nvPr>
+            <p:ph type="sldNum" sz="quarter" idx="12"/>
+          </p:nvPr>
+        </p:nvSpPr>
+        <p:spPr/>
+        <p:txBody>
+          <a:bodyPr/>
+          <a:lstStyle/>
+          <a:p>
+            <a:fld id="{95F0C431-FB59-5241-9837-9D94F974831B}" type="slidenum">
+              <a:rPr lang="en-VN" smtClean="0"/>
+              <a:t>35</a:t>
             </a:fld>
             <a:endParaRPr lang="en-VN"/>
           </a:p>

</xml_diff>